<commit_message>
finalized work on getting started section
</commit_message>
<xml_diff>
--- a/assets/uri_schema.pptx
+++ b/assets/uri_schema.pptx
@@ -254,7 +254,7 @@
           <a:p>
             <a:fld id="{63B2BCCE-A22A-6444-85C1-4AA488A127A0}" type="datetimeFigureOut">
               <a:rPr lang="de-DE" smtClean="0"/>
-              <a:t>23.07.16</a:t>
+              <a:t>26.07.16</a:t>
             </a:fld>
             <a:endParaRPr lang="de-DE"/>
           </a:p>
@@ -424,7 +424,7 @@
           <a:p>
             <a:fld id="{63B2BCCE-A22A-6444-85C1-4AA488A127A0}" type="datetimeFigureOut">
               <a:rPr lang="de-DE" smtClean="0"/>
-              <a:t>23.07.16</a:t>
+              <a:t>26.07.16</a:t>
             </a:fld>
             <a:endParaRPr lang="de-DE"/>
           </a:p>
@@ -604,7 +604,7 @@
           <a:p>
             <a:fld id="{63B2BCCE-A22A-6444-85C1-4AA488A127A0}" type="datetimeFigureOut">
               <a:rPr lang="de-DE" smtClean="0"/>
-              <a:t>23.07.16</a:t>
+              <a:t>26.07.16</a:t>
             </a:fld>
             <a:endParaRPr lang="de-DE"/>
           </a:p>
@@ -774,7 +774,7 @@
           <a:p>
             <a:fld id="{63B2BCCE-A22A-6444-85C1-4AA488A127A0}" type="datetimeFigureOut">
               <a:rPr lang="de-DE" smtClean="0"/>
-              <a:t>23.07.16</a:t>
+              <a:t>26.07.16</a:t>
             </a:fld>
             <a:endParaRPr lang="de-DE"/>
           </a:p>
@@ -1020,7 +1020,7 @@
           <a:p>
             <a:fld id="{63B2BCCE-A22A-6444-85C1-4AA488A127A0}" type="datetimeFigureOut">
               <a:rPr lang="de-DE" smtClean="0"/>
-              <a:t>23.07.16</a:t>
+              <a:t>26.07.16</a:t>
             </a:fld>
             <a:endParaRPr lang="de-DE"/>
           </a:p>
@@ -1252,7 +1252,7 @@
           <a:p>
             <a:fld id="{63B2BCCE-A22A-6444-85C1-4AA488A127A0}" type="datetimeFigureOut">
               <a:rPr lang="de-DE" smtClean="0"/>
-              <a:t>23.07.16</a:t>
+              <a:t>26.07.16</a:t>
             </a:fld>
             <a:endParaRPr lang="de-DE"/>
           </a:p>
@@ -1619,7 +1619,7 @@
           <a:p>
             <a:fld id="{63B2BCCE-A22A-6444-85C1-4AA488A127A0}" type="datetimeFigureOut">
               <a:rPr lang="de-DE" smtClean="0"/>
-              <a:t>23.07.16</a:t>
+              <a:t>26.07.16</a:t>
             </a:fld>
             <a:endParaRPr lang="de-DE"/>
           </a:p>
@@ -1737,7 +1737,7 @@
           <a:p>
             <a:fld id="{63B2BCCE-A22A-6444-85C1-4AA488A127A0}" type="datetimeFigureOut">
               <a:rPr lang="de-DE" smtClean="0"/>
-              <a:t>23.07.16</a:t>
+              <a:t>26.07.16</a:t>
             </a:fld>
             <a:endParaRPr lang="de-DE"/>
           </a:p>
@@ -1832,7 +1832,7 @@
           <a:p>
             <a:fld id="{63B2BCCE-A22A-6444-85C1-4AA488A127A0}" type="datetimeFigureOut">
               <a:rPr lang="de-DE" smtClean="0"/>
-              <a:t>23.07.16</a:t>
+              <a:t>26.07.16</a:t>
             </a:fld>
             <a:endParaRPr lang="de-DE"/>
           </a:p>
@@ -2109,7 +2109,7 @@
           <a:p>
             <a:fld id="{63B2BCCE-A22A-6444-85C1-4AA488A127A0}" type="datetimeFigureOut">
               <a:rPr lang="de-DE" smtClean="0"/>
-              <a:t>23.07.16</a:t>
+              <a:t>26.07.16</a:t>
             </a:fld>
             <a:endParaRPr lang="de-DE"/>
           </a:p>
@@ -2362,7 +2362,7 @@
           <a:p>
             <a:fld id="{63B2BCCE-A22A-6444-85C1-4AA488A127A0}" type="datetimeFigureOut">
               <a:rPr lang="de-DE" smtClean="0"/>
-              <a:t>23.07.16</a:t>
+              <a:t>26.07.16</a:t>
             </a:fld>
             <a:endParaRPr lang="de-DE"/>
           </a:p>
@@ -2575,7 +2575,7 @@
           <a:p>
             <a:fld id="{63B2BCCE-A22A-6444-85C1-4AA488A127A0}" type="datetimeFigureOut">
               <a:rPr lang="de-DE" smtClean="0"/>
-              <a:t>23.07.16</a:t>
+              <a:t>26.07.16</a:t>
             </a:fld>
             <a:endParaRPr lang="de-DE"/>
           </a:p>
@@ -3029,7 +3029,9 @@
             <a:r>
               <a:rPr lang="de-DE" sz="2400" dirty="0" err="1" smtClean="0">
                 <a:solidFill>
-                  <a:schemeClr val="accent2"/>
+                  <a:schemeClr val="accent4">
+                    <a:lumMod val="75000"/>
+                  </a:schemeClr>
                 </a:solidFill>
               </a:rPr>
               <a:t>api</a:t>
@@ -3037,7 +3039,9 @@
             <a:r>
               <a:rPr lang="de-DE" sz="2400" dirty="0" smtClean="0">
                 <a:solidFill>
-                  <a:schemeClr val="accent2"/>
+                  <a:schemeClr val="accent4">
+                    <a:lumMod val="75000"/>
+                  </a:schemeClr>
                 </a:solidFill>
               </a:rPr>
               <a:t>/v1/</a:t>
@@ -3140,7 +3144,7 @@
         </p:nvSpPr>
         <p:spPr>
           <a:xfrm>
-            <a:off x="2388870" y="3859708"/>
+            <a:off x="2068830" y="3859707"/>
             <a:ext cx="2084070" cy="646331"/>
           </a:xfrm>
           <a:prstGeom prst="rect">
@@ -3157,7 +3161,7 @@
             <a:pPr algn="ctr"/>
             <a:r>
               <a:rPr lang="de-DE" dirty="0" smtClean="0"/>
-              <a:t>Base URI </a:t>
+              <a:t>Domain </a:t>
             </a:r>
             <a:r>
               <a:rPr lang="de-DE" dirty="0" err="1" smtClean="0"/>
@@ -3506,7 +3510,7 @@
         </p:nvCxnSpPr>
         <p:spPr>
           <a:xfrm flipV="1">
-            <a:off x="3430905" y="3598277"/>
+            <a:off x="3110865" y="3598277"/>
             <a:ext cx="0" cy="261431"/>
           </a:xfrm>
           <a:prstGeom prst="straightConnector1">
@@ -3579,6 +3583,97 @@
         <p:spPr>
           <a:xfrm flipV="1">
             <a:off x="11149965" y="3598277"/>
+            <a:ext cx="0" cy="261431"/>
+          </a:xfrm>
+          <a:prstGeom prst="straightConnector1">
+            <a:avLst/>
+          </a:prstGeom>
+          <a:ln w="38100">
+            <a:solidFill>
+              <a:schemeClr val="tx1"/>
+            </a:solidFill>
+            <a:tailEnd type="triangle"/>
+          </a:ln>
+        </p:spPr>
+        <p:style>
+          <a:lnRef idx="1">
+            <a:schemeClr val="accent1"/>
+          </a:lnRef>
+          <a:fillRef idx="0">
+            <a:schemeClr val="accent1"/>
+          </a:fillRef>
+          <a:effectRef idx="0">
+            <a:schemeClr val="accent1"/>
+          </a:effectRef>
+          <a:fontRef idx="minor">
+            <a:schemeClr val="tx1"/>
+          </a:fontRef>
+        </p:style>
+      </p:cxnSp>
+      <p:sp>
+        <p:nvSpPr>
+          <p:cNvPr id="17" name="Textfeld 16"/>
+          <p:cNvSpPr txBox="1"/>
+          <p:nvPr/>
+        </p:nvSpPr>
+        <p:spPr>
+          <a:xfrm>
+            <a:off x="3979544" y="3859706"/>
+            <a:ext cx="2084070" cy="646331"/>
+          </a:xfrm>
+          <a:prstGeom prst="rect">
+            <a:avLst/>
+          </a:prstGeom>
+          <a:noFill/>
+        </p:spPr>
+        <p:txBody>
+          <a:bodyPr wrap="square" rtlCol="0">
+            <a:spAutoFit/>
+          </a:bodyPr>
+          <a:lstStyle/>
+          <a:p>
+            <a:pPr algn="ctr"/>
+            <a:r>
+              <a:rPr lang="de-DE" dirty="0" err="1"/>
+              <a:t>B</a:t>
+            </a:r>
+            <a:r>
+              <a:rPr lang="de-DE" dirty="0" err="1" smtClean="0"/>
+              <a:t>asePath</a:t>
+            </a:r>
+            <a:endParaRPr lang="de-DE" dirty="0" smtClean="0"/>
+          </a:p>
+          <a:p>
+            <a:pPr algn="ctr"/>
+            <a:r>
+              <a:rPr lang="de-DE" dirty="0" err="1"/>
+              <a:t>s</a:t>
+            </a:r>
+            <a:r>
+              <a:rPr lang="de-DE" dirty="0" err="1" smtClean="0"/>
+              <a:t>ociocortex</a:t>
+            </a:r>
+            <a:r>
+              <a:rPr lang="de-DE" dirty="0" smtClean="0"/>
+              <a:t> </a:t>
+            </a:r>
+            <a:r>
+              <a:rPr lang="de-DE" dirty="0" err="1" smtClean="0"/>
+              <a:t>server</a:t>
+            </a:r>
+            <a:endParaRPr lang="de-DE" dirty="0" smtClean="0"/>
+          </a:p>
+        </p:txBody>
+      </p:sp>
+      <p:cxnSp>
+        <p:nvCxnSpPr>
+          <p:cNvPr id="19" name="Gerade Verbindung mit Pfeil 18"/>
+          <p:cNvCxnSpPr/>
+          <p:nvPr/>
+        </p:nvCxnSpPr>
+        <p:spPr>
+          <a:xfrm flipV="1">
+            <a:off x="5021580" y="3536173"/>
             <a:ext cx="0" cy="261431"/>
           </a:xfrm>
           <a:prstGeom prst="straightConnector1">

</xml_diff>